<commit_message>
update ptt and doc
</commit_message>
<xml_diff>
--- a/util/шоу.pptx
+++ b/util/шоу.pptx
@@ -307,7 +307,7 @@
             <a:fld id="{1939B775-FA71-40F7-B5D5-4F6DDACE306B}" type="datetimeFigureOut">
               <a:rPr lang="ru-RU" smtClean="0"/>
               <a:pPr/>
-              <a:t>25.05.2016</a:t>
+              <a:t>28.02.2017</a:t>
             </a:fld>
             <a:endParaRPr lang="ru-RU"/>
           </a:p>
@@ -474,7 +474,7 @@
             <a:fld id="{1939B775-FA71-40F7-B5D5-4F6DDACE306B}" type="datetimeFigureOut">
               <a:rPr lang="ru-RU" smtClean="0"/>
               <a:pPr/>
-              <a:t>25.05.2016</a:t>
+              <a:t>28.02.2017</a:t>
             </a:fld>
             <a:endParaRPr lang="ru-RU"/>
           </a:p>
@@ -651,7 +651,7 @@
             <a:fld id="{1939B775-FA71-40F7-B5D5-4F6DDACE306B}" type="datetimeFigureOut">
               <a:rPr lang="ru-RU" smtClean="0"/>
               <a:pPr/>
-              <a:t>25.05.2016</a:t>
+              <a:t>28.02.2017</a:t>
             </a:fld>
             <a:endParaRPr lang="ru-RU"/>
           </a:p>
@@ -818,7 +818,7 @@
             <a:fld id="{1939B775-FA71-40F7-B5D5-4F6DDACE306B}" type="datetimeFigureOut">
               <a:rPr lang="ru-RU" smtClean="0"/>
               <a:pPr/>
-              <a:t>25.05.2016</a:t>
+              <a:t>28.02.2017</a:t>
             </a:fld>
             <a:endParaRPr lang="ru-RU"/>
           </a:p>
@@ -1061,7 +1061,7 @@
             <a:fld id="{1939B775-FA71-40F7-B5D5-4F6DDACE306B}" type="datetimeFigureOut">
               <a:rPr lang="ru-RU" smtClean="0"/>
               <a:pPr/>
-              <a:t>25.05.2016</a:t>
+              <a:t>28.02.2017</a:t>
             </a:fld>
             <a:endParaRPr lang="ru-RU"/>
           </a:p>
@@ -1346,7 +1346,7 @@
             <a:fld id="{1939B775-FA71-40F7-B5D5-4F6DDACE306B}" type="datetimeFigureOut">
               <a:rPr lang="ru-RU" smtClean="0"/>
               <a:pPr/>
-              <a:t>25.05.2016</a:t>
+              <a:t>28.02.2017</a:t>
             </a:fld>
             <a:endParaRPr lang="ru-RU"/>
           </a:p>
@@ -1765,7 +1765,7 @@
             <a:fld id="{1939B775-FA71-40F7-B5D5-4F6DDACE306B}" type="datetimeFigureOut">
               <a:rPr lang="ru-RU" smtClean="0"/>
               <a:pPr/>
-              <a:t>25.05.2016</a:t>
+              <a:t>28.02.2017</a:t>
             </a:fld>
             <a:endParaRPr lang="ru-RU"/>
           </a:p>
@@ -1880,7 +1880,7 @@
             <a:fld id="{1939B775-FA71-40F7-B5D5-4F6DDACE306B}" type="datetimeFigureOut">
               <a:rPr lang="ru-RU" smtClean="0"/>
               <a:pPr/>
-              <a:t>25.05.2016</a:t>
+              <a:t>28.02.2017</a:t>
             </a:fld>
             <a:endParaRPr lang="ru-RU"/>
           </a:p>
@@ -1972,7 +1972,7 @@
             <a:fld id="{1939B775-FA71-40F7-B5D5-4F6DDACE306B}" type="datetimeFigureOut">
               <a:rPr lang="ru-RU" smtClean="0"/>
               <a:pPr/>
-              <a:t>25.05.2016</a:t>
+              <a:t>28.02.2017</a:t>
             </a:fld>
             <a:endParaRPr lang="ru-RU"/>
           </a:p>
@@ -2246,7 +2246,7 @@
             <a:fld id="{1939B775-FA71-40F7-B5D5-4F6DDACE306B}" type="datetimeFigureOut">
               <a:rPr lang="ru-RU" smtClean="0"/>
               <a:pPr/>
-              <a:t>25.05.2016</a:t>
+              <a:t>28.02.2017</a:t>
             </a:fld>
             <a:endParaRPr lang="ru-RU"/>
           </a:p>
@@ -2496,7 +2496,7 @@
             <a:fld id="{1939B775-FA71-40F7-B5D5-4F6DDACE306B}" type="datetimeFigureOut">
               <a:rPr lang="ru-RU" smtClean="0"/>
               <a:pPr/>
-              <a:t>25.05.2016</a:t>
+              <a:t>28.02.2017</a:t>
             </a:fld>
             <a:endParaRPr lang="ru-RU"/>
           </a:p>
@@ -2706,7 +2706,7 @@
             <a:fld id="{1939B775-FA71-40F7-B5D5-4F6DDACE306B}" type="datetimeFigureOut">
               <a:rPr lang="ru-RU" smtClean="0"/>
               <a:pPr/>
-              <a:t>25.05.2016</a:t>
+              <a:t>28.02.2017</a:t>
             </a:fld>
             <a:endParaRPr lang="ru-RU"/>
           </a:p>
@@ -3095,8 +3095,12 @@
           <a:lstStyle/>
           <a:p>
             <a:r>
-              <a:rPr lang="ru-RU" b="1" dirty="0"/>
-              <a:t>Исследование эффективности алгоритмов машинного обучения на примере игры 2048</a:t>
+              <a:rPr lang="ru-RU" b="1" dirty="0" smtClean="0"/>
+              <a:t>Реализация алгоритмов машинного обучения на основе компьютерной игры «2048</a:t>
+            </a:r>
+            <a:r>
+              <a:rPr lang="ru-RU" b="1" dirty="0" smtClean="0"/>
+              <a:t>»</a:t>
             </a:r>
             <a:r>
               <a:rPr lang="ru-RU" dirty="0"/>
@@ -3226,11 +3230,7 @@
           <a:p>
             <a:r>
               <a:rPr lang="ru-RU" dirty="0" smtClean="0"/>
-              <a:t>Сопряжена с </a:t>
-            </a:r>
-            <a:r>
-              <a:rPr lang="ru-RU" dirty="0" smtClean="0"/>
-              <a:t>трудностями, такими как необходимость построения обучающей выборки.</a:t>
+              <a:t>Сопряжена с трудностями, такими как необходимость построения обучающей выборки.</a:t>
             </a:r>
             <a:endParaRPr lang="ru-RU" dirty="0"/>
           </a:p>
@@ -3517,9 +3517,16 @@
             <p:ph type="title"/>
           </p:nvPr>
         </p:nvSpPr>
-        <p:spPr/>
+        <p:spPr>
+          <a:xfrm>
+            <a:off x="285720" y="2428868"/>
+            <a:ext cx="4714908" cy="2071702"/>
+          </a:xfrm>
+        </p:spPr>
         <p:txBody>
-          <a:bodyPr/>
+          <a:bodyPr>
+            <a:normAutofit/>
+          </a:bodyPr>
           <a:lstStyle/>
           <a:p>
             <a:r>
@@ -3532,12 +3539,18 @@
       </p:sp>
       <p:pic>
         <p:nvPicPr>
-          <p:cNvPr id="4" name="Рисунок 3"/>
+          <p:cNvPr id="5" name="Picture 2"/>
           <p:cNvPicPr/>
           <p:nvPr/>
         </p:nvPicPr>
         <p:blipFill>
-          <a:blip r:embed="rId2" cstate="print"/>
+          <a:blip r:embed="rId2" cstate="print">
+            <a:extLst>
+              <a:ext uri="{28A0092B-C50C-407E-A947-70E740481C1C}">
+                <a14:useLocalDpi xmlns="" xmlns:wpc="http://schemas.microsoft.com/office/word/2010/wordprocessingCanvas" xmlns:mc="http://schemas.openxmlformats.org/markup-compatibility/2006" xmlns:o="urn:schemas-microsoft-com:office:office" xmlns:m="http://schemas.openxmlformats.org/officeDocument/2006/math" xmlns:v="urn:schemas-microsoft-com:vml" xmlns:wp14="http://schemas.microsoft.com/office/word/2010/wordprocessingDrawing" xmlns:wp="http://schemas.openxmlformats.org/drawingml/2006/wordprocessingDrawing" xmlns:w10="urn:schemas-microsoft-com:office:word" xmlns:w="http://schemas.openxmlformats.org/wordprocessingml/2006/main" xmlns:w14="http://schemas.microsoft.com/office/word/2010/wordml" xmlns:w15="http://schemas.microsoft.com/office/word/2012/wordml" xmlns:wpg="http://schemas.microsoft.com/office/word/2010/wordprocessingGroup" xmlns:wpi="http://schemas.microsoft.com/office/word/2010/wordprocessingInk" xmlns:wne="http://schemas.microsoft.com/office/word/2006/wordml" xmlns:wps="http://schemas.microsoft.com/office/word/2010/wordprocessingShape" xmlns:a14="http://schemas.microsoft.com/office/drawing/2010/main" xmlns:pic="http://schemas.openxmlformats.org/drawingml/2006/picture" xmlns:lc="http://schemas.openxmlformats.org/drawingml/2006/lockedCanvas" val="0"/>
+              </a:ext>
+            </a:extLst>
+          </a:blip>
           <a:srcRect/>
           <a:stretch>
             <a:fillRect/>
@@ -3545,18 +3558,15 @@
         </p:blipFill>
         <p:spPr bwMode="auto">
           <a:xfrm>
-            <a:off x="3071802" y="1285860"/>
-            <a:ext cx="3281376" cy="5268688"/>
+            <a:off x="4857752" y="214290"/>
+            <a:ext cx="3219450" cy="6421539"/>
           </a:xfrm>
           <a:prstGeom prst="rect">
             <a:avLst/>
           </a:prstGeom>
           <a:noFill/>
-          <a:ln w="9525">
+          <a:ln>
             <a:noFill/>
-            <a:miter lim="800000"/>
-            <a:headEnd/>
-            <a:tailEnd/>
           </a:ln>
         </p:spPr>
       </p:pic>
@@ -8209,21 +8219,21 @@
                         </a:spcAft>
                       </a:pPr>
                       <a:r>
-                        <a:rPr lang="ru-RU" sz="2000">
+                        <a:rPr lang="ru-RU" sz="2000" dirty="0">
                           <a:latin typeface="Times New Roman"/>
                           <a:ea typeface="Times New Roman"/>
                           <a:cs typeface="Times New Roman"/>
                         </a:rPr>
-                        <a:t>6540</a:t>
+                        <a:t>12764</a:t>
                       </a:r>
-                      <a:endParaRPr lang="ru-RU" sz="2000">
+                      <a:endParaRPr lang="ru-RU" sz="2000" dirty="0">
                         <a:latin typeface="Calibri"/>
                         <a:ea typeface="Times New Roman"/>
                         <a:cs typeface="Times New Roman"/>
                       </a:endParaRPr>
                     </a:p>
                   </a:txBody>
-                  <a:tcPr marL="66812" marR="66812" marT="0" marB="0" anchor="ctr">
+                  <a:tcPr marL="68580" marR="68580" marT="0" marB="0" anchor="ctr">
                     <a:lnL w="12700" cap="flat" cmpd="sng" algn="ctr">
                       <a:solidFill>
                         <a:srgbClr val="000000"/>
@@ -8276,14 +8286,14 @@
                         </a:spcAft>
                       </a:pPr>
                       <a:r>
-                        <a:rPr lang="ru-RU" sz="2000">
+                        <a:rPr lang="ru-RU" sz="2000" dirty="0">
                           <a:latin typeface="Times New Roman"/>
                           <a:ea typeface="Times New Roman"/>
                           <a:cs typeface="Times New Roman"/>
                         </a:rPr>
                         <a:t>31368</a:t>
                       </a:r>
-                      <a:endParaRPr lang="ru-RU" sz="2000">
+                      <a:endParaRPr lang="ru-RU" sz="2000" dirty="0">
                         <a:latin typeface="Calibri"/>
                         <a:ea typeface="Times New Roman"/>
                         <a:cs typeface="Times New Roman"/>
@@ -8613,21 +8623,21 @@
                         </a:spcAft>
                       </a:pPr>
                       <a:r>
-                        <a:rPr lang="ru-RU" sz="2000">
+                        <a:rPr lang="ru-RU" sz="2000" dirty="0">
                           <a:latin typeface="Times New Roman"/>
                           <a:ea typeface="Times New Roman"/>
                           <a:cs typeface="Times New Roman"/>
                         </a:rPr>
-                        <a:t>2658.8118</a:t>
+                        <a:t>3519.8833</a:t>
                       </a:r>
-                      <a:endParaRPr lang="ru-RU" sz="2000">
+                      <a:endParaRPr lang="ru-RU" sz="2000" dirty="0">
                         <a:latin typeface="Calibri"/>
                         <a:ea typeface="Times New Roman"/>
                         <a:cs typeface="Times New Roman"/>
                       </a:endParaRPr>
                     </a:p>
                   </a:txBody>
-                  <a:tcPr marL="66812" marR="66812" marT="0" marB="0" anchor="ctr">
+                  <a:tcPr marL="68580" marR="68580" marT="0" marB="0" anchor="ctr">
                     <a:lnL w="12700" cap="flat" cmpd="sng" algn="ctr">
                       <a:solidFill>
                         <a:srgbClr val="000000"/>
@@ -8680,14 +8690,14 @@
                         </a:spcAft>
                       </a:pPr>
                       <a:r>
-                        <a:rPr lang="ru-RU" sz="2000">
+                        <a:rPr lang="ru-RU" sz="2000" dirty="0">
                           <a:latin typeface="Times New Roman"/>
                           <a:ea typeface="Times New Roman"/>
                           <a:cs typeface="Times New Roman"/>
                         </a:rPr>
                         <a:t>7324.3076</a:t>
                       </a:r>
-                      <a:endParaRPr lang="ru-RU" sz="2000">
+                      <a:endParaRPr lang="ru-RU" sz="2000" dirty="0">
                         <a:latin typeface="Calibri"/>
                         <a:ea typeface="Times New Roman"/>
                         <a:cs typeface="Times New Roman"/>
@@ -9017,21 +9027,21 @@
                         </a:spcAft>
                       </a:pPr>
                       <a:r>
-                        <a:rPr lang="ru-RU" sz="2000">
+                        <a:rPr lang="ru-RU" sz="2000" dirty="0">
                           <a:latin typeface="Times New Roman"/>
                           <a:ea typeface="Times New Roman"/>
                           <a:cs typeface="Times New Roman"/>
                         </a:rPr>
-                        <a:t>2536</a:t>
+                        <a:t>2916</a:t>
                       </a:r>
-                      <a:endParaRPr lang="ru-RU" sz="2000">
+                      <a:endParaRPr lang="ru-RU" sz="2000" dirty="0">
                         <a:latin typeface="Calibri"/>
                         <a:ea typeface="Times New Roman"/>
                         <a:cs typeface="Times New Roman"/>
                       </a:endParaRPr>
                     </a:p>
                   </a:txBody>
-                  <a:tcPr marL="66812" marR="66812" marT="0" marB="0" anchor="ctr">
+                  <a:tcPr marL="68580" marR="68580" marT="0" marB="0" anchor="ctr">
                     <a:lnL w="12700" cap="flat" cmpd="sng" algn="ctr">
                       <a:solidFill>
                         <a:srgbClr val="000000"/>
@@ -9421,21 +9431,21 @@
                         </a:spcAft>
                       </a:pPr>
                       <a:r>
-                        <a:rPr lang="ru-RU" sz="2000">
+                        <a:rPr lang="ru-RU" sz="2000" dirty="0">
                           <a:latin typeface="Times New Roman"/>
                           <a:ea typeface="Times New Roman"/>
                           <a:cs typeface="Times New Roman"/>
                         </a:rPr>
                         <a:t>0</a:t>
                       </a:r>
-                      <a:endParaRPr lang="ru-RU" sz="2000">
+                      <a:endParaRPr lang="ru-RU" sz="2000" dirty="0">
                         <a:latin typeface="Calibri"/>
                         <a:ea typeface="Times New Roman"/>
                         <a:cs typeface="Times New Roman"/>
                       </a:endParaRPr>
                     </a:p>
                   </a:txBody>
-                  <a:tcPr marL="66812" marR="66812" marT="0" marB="0" anchor="ctr">
+                  <a:tcPr marL="68580" marR="68580" marT="0" marB="0" anchor="ctr">
                     <a:lnL w="12700" cap="flat" cmpd="sng" algn="ctr">
                       <a:solidFill>
                         <a:srgbClr val="000000"/>
@@ -9863,15 +9873,19 @@
           <a:p>
             <a:pPr lvl="0"/>
             <a:r>
+              <a:rPr lang="ru-RU" dirty="0" smtClean="0"/>
+              <a:t>реализован гибкий настраиваемый сервер для произвольных игр; полностью разработана игра 2048, заложены правила основной игры и предоставлена возможность расширения функционала;</a:t>
+            </a:r>
+          </a:p>
+          <a:p>
+            <a:pPr lvl="0"/>
+            <a:r>
+              <a:rPr lang="ru-RU" dirty="0" smtClean="0"/>
+              <a:t>реализованы </a:t>
+            </a:r>
+            <a:r>
               <a:rPr lang="ru-RU" dirty="0"/>
-              <a:t>реализован гибкий настраиваемый сервер для игры в 2048, заложены правила основной игры и предоставлена возможность расширения функционала;</a:t>
-            </a:r>
-          </a:p>
-          <a:p>
-            <a:pPr lvl="0"/>
-            <a:r>
-              <a:rPr lang="ru-RU" dirty="0"/>
-              <a:t>реализованы и протестированы некоторые примитивные алгоритмы, представлены соответствующие результаты</a:t>
+              <a:t>и протестированы некоторые примитивные алгоритмы, представлены соответствующие результаты</a:t>
             </a:r>
             <a:r>
               <a:rPr lang="ru-RU" dirty="0" smtClean="0"/>
@@ -9882,11 +9896,7 @@
             <a:pPr lvl="0"/>
             <a:r>
               <a:rPr lang="ru-RU" dirty="0" smtClean="0"/>
-              <a:t>реализованы два искусственных интеллекта, играющих в 2048, основанных на алгоритмах машинного обучения, исследованы их преимущества </a:t>
-            </a:r>
-            <a:r>
-              <a:rPr lang="ru-RU" smtClean="0"/>
-              <a:t>и недостатки.</a:t>
+              <a:t>реализованы два искусственных интеллекта, играющих в 2048, основанных на алгоритмах машинного обучения, исследованы их преимущества и недостатки.</a:t>
             </a:r>
             <a:endParaRPr lang="ru-RU" dirty="0"/>
           </a:p>

</xml_diff>